<commit_message>
calotracker updated on ppt
</commit_message>
<xml_diff>
--- a/Calotracker @ yeshwantrao.pptx
+++ b/Calotracker @ yeshwantrao.pptx
@@ -115,6 +115,11 @@
       </a:defRPr>
     </a:lvl9pPr>
   </p:defaultTextStyle>
+  <p:extLst>
+    <p:ext uri="{EFAFB233-063F-42B5-8137-9DF3F51BA10A}">
+      <p15:sldGuideLst xmlns:p15="http://schemas.microsoft.com/office/powerpoint/2012/main"/>
+    </p:ext>
+  </p:extLst>
 </p:presentation>
 </file>
 
@@ -20161,7 +20166,7 @@
         <p:spPr>
           <a:xfrm>
             <a:off x="6695873" y="1259175"/>
-            <a:ext cx="4710522" cy="4339650"/>
+            <a:ext cx="4710522" cy="4708981"/>
           </a:xfrm>
           <a:prstGeom prst="rect">
             <a:avLst/>
@@ -20197,6 +20202,16 @@
             <a:r>
               <a:rPr lang="en-US" sz="1200" dirty="0"/>
               <a:t>Use microservices for scalability and maintainability.</a:t>
+            </a:r>
+          </a:p>
+          <a:p>
+            <a:pPr marL="628650" lvl="1" indent="-171450">
+              <a:buFont typeface="Arial" panose="020B0604020202020204" pitchFamily="34" charset="0"/>
+              <a:buChar char="•"/>
+            </a:pPr>
+            <a:r>
+              <a:rPr lang="en-US" sz="1200" dirty="0"/>
+              <a:t>Have branching strategy for Dev, QA, Pre-Pod, Prod &amp; Hotfix.</a:t>
             </a:r>
           </a:p>
           <a:p>
@@ -30268,6 +30283,15 @@
 </file>
 
 <file path=customXml/item1.xml><?xml version="1.0" encoding="utf-8"?>
+<?mso-contentType ?>
+<FormTemplates xmlns="http://schemas.microsoft.com/sharepoint/v3/contenttype/forms">
+  <Display>DocumentLibraryForm</Display>
+  <Edit>DocumentLibraryForm</Edit>
+  <New>DocumentLibraryForm</New>
+</FormTemplates>
+</file>
+
+<file path=customXml/item2.xml><?xml version="1.0" encoding="utf-8"?>
 <ct:contentTypeSchema xmlns:ct="http://schemas.microsoft.com/office/2006/metadata/contentType" xmlns:ma="http://schemas.microsoft.com/office/2006/metadata/properties/metaAttributes" ct:_="" ma:_="" ma:contentTypeName="Document" ma:contentTypeID="0x0101006FD39E0294475E4FB498F38522F3B91F" ma:contentTypeVersion="1" ma:contentTypeDescription="Create a new document." ma:contentTypeScope="" ma:versionID="e196e535aa6abb06685931300f795b33">
   <xsd:schema xmlns:xsd="http://www.w3.org/2001/XMLSchema" xmlns:xs="http://www.w3.org/2001/XMLSchema" xmlns:p="http://schemas.microsoft.com/office/2006/metadata/properties" xmlns:ns3="538423bf-87dd-43a1-b086-8c9778eae27b" targetNamespace="http://schemas.microsoft.com/office/2006/metadata/properties" ma:root="true" ma:fieldsID="68aa0f30c31bc7b3d75cff18b0d571fc" ns3:_="">
     <xsd:import namespace="538423bf-87dd-43a1-b086-8c9778eae27b"/>
@@ -30393,15 +30417,6 @@
 </ct:contentTypeSchema>
 </file>
 
-<file path=customXml/item2.xml><?xml version="1.0" encoding="utf-8"?>
-<?mso-contentType ?>
-<FormTemplates xmlns="http://schemas.microsoft.com/sharepoint/v3/contenttype/forms">
-  <Display>DocumentLibraryForm</Display>
-  <Edit>DocumentLibraryForm</Edit>
-  <New>DocumentLibraryForm</New>
-</FormTemplates>
-</file>
-
 <file path=customXml/item3.xml><?xml version="1.0" encoding="utf-8"?>
 <p:properties xmlns:p="http://schemas.microsoft.com/office/2006/metadata/properties" xmlns:xsi="http://www.w3.org/2001/XMLSchema-instance" xmlns:pc="http://schemas.microsoft.com/office/infopath/2007/PartnerControls">
   <documentManagement/>
@@ -30409,6 +30424,14 @@
 </file>
 
 <file path=customXml/itemProps1.xml><?xml version="1.0" encoding="utf-8"?>
+<ds:datastoreItem xmlns:ds="http://schemas.openxmlformats.org/officeDocument/2006/customXml" ds:itemID="{0C84751A-5DC5-4C8F-8571-47943827BC1A}">
+  <ds:schemaRefs>
+    <ds:schemaRef ds:uri="http://schemas.microsoft.com/sharepoint/v3/contenttype/forms"/>
+  </ds:schemaRefs>
+</ds:datastoreItem>
+</file>
+
+<file path=customXml/itemProps2.xml><?xml version="1.0" encoding="utf-8"?>
 <ds:datastoreItem xmlns:ds="http://schemas.openxmlformats.org/officeDocument/2006/customXml" ds:itemID="{0B63A29D-061A-4257-A242-6750E5F09BB1}">
   <ds:schemaRefs>
     <ds:schemaRef ds:uri="http://schemas.microsoft.com/office/2006/metadata/contentType"/>
@@ -30422,14 +30445,6 @@
     <ds:schemaRef ds:uri="http://purl.org/dc/elements/1.1/"/>
     <ds:schemaRef ds:uri="http://purl.org/dc/terms/"/>
     <ds:schemaRef ds:uri="http://schemas.microsoft.com/internal/obd"/>
-  </ds:schemaRefs>
-</ds:datastoreItem>
-</file>
-
-<file path=customXml/itemProps2.xml><?xml version="1.0" encoding="utf-8"?>
-<ds:datastoreItem xmlns:ds="http://schemas.openxmlformats.org/officeDocument/2006/customXml" ds:itemID="{0C84751A-5DC5-4C8F-8571-47943827BC1A}">
-  <ds:schemaRefs>
-    <ds:schemaRef ds:uri="http://schemas.microsoft.com/sharepoint/v3/contenttype/forms"/>
   </ds:schemaRefs>
 </ds:datastoreItem>
 </file>

</xml_diff>